<commit_message>
commit the final version
</commit_message>
<xml_diff>
--- a/Document/slide.pptx
+++ b/Document/slide.pptx
@@ -158,7 +158,7 @@
   </p:defaultTextStyle>
   <p:extLst>
     <p:ext uri="{EFAFB233-063F-42B5-8137-9DF3F51BA10A}">
-      <p15:sldGuideLst xmlns:p15="http://schemas.microsoft.com/office/powerpoint/2012/main" xmlns="">
+      <p15:sldGuideLst xmlns:p15="http://schemas.microsoft.com/office/powerpoint/2012/main">
         <p15:guide id="1" orient="horz" pos="2160">
           <p15:clr>
             <a:srgbClr val="A4A3A4"/>
@@ -172,7 +172,7 @@
       </p15:sldGuideLst>
     </p:ext>
     <p:ext uri="{2D200454-40CA-4A62-9FC3-DE9A4176ACB9}">
-      <p15:notesGuideLst xmlns:p15="http://schemas.microsoft.com/office/powerpoint/2012/main" xmlns=""/>
+      <p15:notesGuideLst xmlns:p15="http://schemas.microsoft.com/office/powerpoint/2012/main"/>
     </p:ext>
   </p:extLst>
 </p:presentation>
@@ -4275,7 +4275,7 @@
               </a14:hiddenLine>
             </a:ext>
             <a:ext uri="{FAA26D3D-D897-4be2-8F04-BA451C77F1D7}">
-              <ma14:placeholderFlag xmlns:ma14="http://schemas.microsoft.com/office/mac/drawingml/2011/main" xmlns="" val="1"/>
+              <ma14:placeholderFlag xmlns="" xmlns:ma14="http://schemas.microsoft.com/office/mac/drawingml/2011/main" val="1"/>
             </a:ext>
           </a:extLst>
         </p:spPr>
@@ -4336,7 +4336,7 @@
               </a14:hiddenLine>
             </a:ext>
             <a:ext uri="{FAA26D3D-D897-4be2-8F04-BA451C77F1D7}">
-              <ma14:placeholderFlag xmlns:ma14="http://schemas.microsoft.com/office/mac/drawingml/2011/main" xmlns="" val="1"/>
+              <ma14:placeholderFlag xmlns="" xmlns:ma14="http://schemas.microsoft.com/office/mac/drawingml/2011/main" val="1"/>
             </a:ext>
           </a:extLst>
         </p:spPr>
@@ -5277,13 +5277,18 @@
           </a:p>
           <a:p>
             <a:r>
-              <a:rPr lang="en-US" altLang="ja-JP" sz="5700" dirty="0" smtClean="0">
+              <a:rPr lang="en-US" altLang="ja-JP" sz="5700" smtClean="0">
                 <a:solidFill>
                   <a:srgbClr val="0070C0"/>
                 </a:solidFill>
               </a:rPr>
-              <a:t>Make people smile!</a:t>
-            </a:r>
+              <a:t>Cackle Conversation!</a:t>
+            </a:r>
+            <a:endParaRPr lang="en-US" altLang="ja-JP" sz="5700" dirty="0" smtClean="0">
+              <a:solidFill>
+                <a:srgbClr val="0070C0"/>
+              </a:solidFill>
+            </a:endParaRPr>
           </a:p>
           <a:p>
             <a:r>
@@ -6479,11 +6484,7 @@
           <a:p>
             <a:r>
               <a:rPr lang="en-US"/>
-              <a:t>Server-side language</a:t>
-            </a:r>
-            <a:r>
-              <a:rPr lang="en-US"/>
-              <a:t>: </a:t>
+              <a:t>Server-side language: </a:t>
             </a:r>
             <a:r>
               <a:rPr lang="en-US" smtClean="0"/>
@@ -6494,30 +6495,17 @@
           <a:p>
             <a:r>
               <a:rPr lang="en-US"/>
-              <a:t>Database</a:t>
-            </a:r>
-            <a:r>
-              <a:rPr lang="en-US"/>
-              <a:t>: </a:t>
+              <a:t>Database: </a:t>
             </a:r>
             <a:r>
               <a:rPr lang="en-US" smtClean="0"/>
               <a:t>MySQL.</a:t>
             </a:r>
-            <a:endParaRPr lang="en-US" smtClean="0"/>
           </a:p>
           <a:p>
             <a:r>
               <a:rPr lang="en-US" smtClean="0"/>
-              <a:t>Using </a:t>
-            </a:r>
-            <a:r>
-              <a:rPr lang="en-US" smtClean="0"/>
-              <a:t>MVC </a:t>
-            </a:r>
-            <a:r>
-              <a:rPr lang="en-US" smtClean="0"/>
-              <a:t>model :</a:t>
+              <a:t>Using MVC model :</a:t>
             </a:r>
             <a:endParaRPr lang="en-US" dirty="0" smtClean="0"/>
           </a:p>
@@ -10135,7 +10123,7 @@
               </a14:hiddenLine>
             </a:ext>
             <a:ext uri="{FAA26D3D-D897-4be2-8F04-BA451C77F1D7}">
-              <ma14:placeholderFlag xmlns:ma14="http://schemas.microsoft.com/office/mac/drawingml/2011/main" xmlns="" val="1"/>
+              <ma14:placeholderFlag xmlns="" xmlns:ma14="http://schemas.microsoft.com/office/mac/drawingml/2011/main" val="1"/>
             </a:ext>
           </a:extLst>
         </p:spPr>

</xml_diff>